<commit_message>
add comment, update ppt
</commit_message>
<xml_diff>
--- a/pyplot-tutorial.pptx
+++ b/pyplot-tutorial.pptx
@@ -8103,6 +8103,15 @@
               <a:rPr lang="en-US" sz="2800" dirty="0"/>
               <a:t>Nabeel Nasir</a:t>
             </a:r>
+          </a:p>
+          <a:p>
+            <a:r>
+              <a:rPr lang="en-IN" sz="2800" dirty="0">
+                <a:hlinkClick r:id="rId2"/>
+              </a:rPr>
+              <a:t>gitlab.com/nabeeln7/pyplot-tutorial</a:t>
+            </a:r>
+            <a:endParaRPr lang="en-US" sz="2800" dirty="0"/>
           </a:p>
         </p:txBody>
       </p:sp>

</xml_diff>